<commit_message>
Arreglo de actividad y actividad de ingles
</commit_message>
<xml_diff>
--- a/Comunicación/6)Ultima actividad/Escritura.pptx
+++ b/Comunicación/6)Ultima actividad/Escritura.pptx
@@ -2154,7 +2154,7 @@
           </a:ln>
           <a:extLst>
             <a:ext uri="{C572A759-6A51-4108-AA02-DFA0A04FC94B}">
-              <ma14:wrappingTextBoxFlag xmlns:ma14="http://schemas.microsoft.com/office/mac/drawingml/2011/main" xmlns="" val="1"/>
+              <ma14:wrappingTextBoxFlag xmlns="" xmlns:ma14="http://schemas.microsoft.com/office/mac/drawingml/2011/main" val="1"/>
             </a:ext>
           </a:extLst>
         </p:spPr>
@@ -2217,7 +2217,7 @@
           </a:ln>
           <a:extLst>
             <a:ext uri="{C572A759-6A51-4108-AA02-DFA0A04FC94B}">
-              <ma14:wrappingTextBoxFlag xmlns:ma14="http://schemas.microsoft.com/office/mac/drawingml/2011/main" xmlns="" val="1"/>
+              <ma14:wrappingTextBoxFlag xmlns="" xmlns:ma14="http://schemas.microsoft.com/office/mac/drawingml/2011/main" val="1"/>
             </a:ext>
           </a:extLst>
         </p:spPr>
@@ -5277,14 +5277,7 @@
             <a:pPr algn="just"/>
             <a:r>
               <a:rPr lang="es-MX" sz="4400" dirty="0"/>
-              <a:t>Joven se desmaya porque le cayo una hoja en la cabeza:</a:t>
-            </a:r>
-          </a:p>
-          <a:p>
-            <a:pPr algn="just"/>
-            <a:r>
-              <a:rPr lang="es-MX" sz="4400" dirty="0"/>
-              <a:t>Un extraño incidente que tuvo lugar en el barrio Tintal donde vive la joven Mafalda, su amiga se desmayo porque le cayo una hoja en la cabeza. </a:t>
+              <a:t>Una joven del barrio Tintal vivió un extraño incidente que la dejó desconcertada y con un poco de vergüenza. Mafalda se encontraba en el parque junto a su amiga Susanita cuando tuvo una duda existencial relacionada con los ovnis. Sin embargo, la respuesta de su amiga provocó una reacción inesperada.</a:t>
             </a:r>
           </a:p>
           <a:p>
@@ -5295,7 +5288,7 @@
             <a:pPr algn="just"/>
             <a:r>
               <a:rPr lang="es-MX" sz="4400" dirty="0"/>
-              <a:t>Se entrevisto a la joven Mafalda y conto los hechos ocurridos, ella se encontraba en el parque junto a su amiga Susanita, en un momento Mafalda tiene una duda existencial, después de pensar en su idea procede a hacerle la pregunta a su amiga Susanita, la pregunta es relacionada con los ovnis y esta le pregunta textualmente:  </a:t>
+              <a:t>Cuando Mafalda le preguntó qué haría si apareciera un platillo volador y seres de otro planeta intentaran llevarlas a su mundo, Susanita respondió con incredulidad: “No haría nada, porque no creo que nadie viva en otro planeta, ni que nadie baje para llevarnos a ningún mundo, ni creo nada de esas estupideces”.</a:t>
             </a:r>
           </a:p>
           <a:p>
@@ -5306,14 +5299,7 @@
             <a:pPr algn="just"/>
             <a:r>
               <a:rPr lang="es-MX" sz="4400" dirty="0"/>
-              <a:t>“¿Qué harías si de pronto apareciera un plato volador?” </a:t>
-            </a:r>
-          </a:p>
-          <a:p>
-            <a:pPr algn="just"/>
-            <a:r>
-              <a:rPr lang="es-MX" sz="4400" dirty="0"/>
-              <a:t>“¿Qué harías si seres de otro planeta bajaran e intentaran llevarnos a su mundo?” </a:t>
+              <a:t>En ese momento, una hoja de un árbol cayó sobre la cabeza de Susanita, causando un impacto tan fuerte que perdió el conocimiento. Mafalda, asustada, intentó ayudar a su amiga y llamó a los servicios de emergencia.</a:t>
             </a:r>
           </a:p>
           <a:p>
@@ -5324,29 +5310,7 @@
             <a:pPr algn="just"/>
             <a:r>
               <a:rPr lang="es-MX" sz="4400" dirty="0"/>
-              <a:t>A lo cual su compañera Susanita le responde lo siguiente:</a:t>
-            </a:r>
-          </a:p>
-          <a:p>
-            <a:pPr algn="just"/>
-            <a:endParaRPr lang="es-MX" sz="4400" dirty="0"/>
-          </a:p>
-          <a:p>
-            <a:pPr algn="just"/>
-            <a:r>
-              <a:rPr lang="es-MX" sz="4400" dirty="0"/>
-              <a:t> “¡No haría nada! ¡Porque no creo que nadie viva en otro planeta, ni que nadie baje para llevarnos a ningún mundo, ni creo nada de esas estupideces!” </a:t>
-            </a:r>
-          </a:p>
-          <a:p>
-            <a:pPr algn="just"/>
-            <a:endParaRPr lang="es-MX" sz="4400" dirty="0"/>
-          </a:p>
-          <a:p>
-            <a:pPr algn="just"/>
-            <a:r>
-              <a:rPr lang="es-MX" sz="4400" dirty="0"/>
-              <a:t>Después de decir esa frase, Susanita en este caso la afectada le cae una hoja de un árbol y fue tanto el impacto para ella que se desmayo, ella pensó que era un ser de otro planeta, por lo que estaría en duda la creencia de ella.</a:t>
+              <a:t>Finalmente, la joven Susanita se recuperó y los médicos explicaron que el desmayo fue producto de la conmoción del impacto de la hoja en su cabeza, y no de sus creencias sobre los ovnis. Mafalda, aliviada de que su amiga estuviera bien, reflexionó sobre la importancia de respetar las creencias de los demás y de ser cuidadosos con las palabras que elegimos para expresarnos.</a:t>
             </a:r>
             <a:endParaRPr lang="es-CO" sz="4400" dirty="0"/>
           </a:p>

</xml_diff>